<commit_message>
version 3 READme file
</commit_message>
<xml_diff>
--- a/Presentation_Aviation.pptx
+++ b/Presentation_Aviation.pptx
@@ -10,8 +10,8 @@
     <p:sldId id="258" r:id="rId4"/>
     <p:sldId id="259" r:id="rId5"/>
     <p:sldId id="260" r:id="rId6"/>
-    <p:sldId id="265" r:id="rId7"/>
-    <p:sldId id="269" r:id="rId8"/>
+    <p:sldId id="269" r:id="rId7"/>
+    <p:sldId id="265" r:id="rId8"/>
     <p:sldId id="268" r:id="rId9"/>
     <p:sldId id="267" r:id="rId10"/>
     <p:sldId id="266" r:id="rId11"/>
@@ -4084,33 +4084,52 @@
             <p:ph idx="1"/>
           </p:nvPr>
         </p:nvSpPr>
-        <p:spPr/>
-        <p:txBody>
-          <a:bodyPr/>
-          <a:lstStyle/>
-          <a:p>
-            <a:pPr algn="just"/>
+        <p:spPr>
+          <a:xfrm>
+            <a:off x="838200" y="2178423"/>
+            <a:ext cx="10515600" cy="3998539"/>
+          </a:xfrm>
+        </p:spPr>
+        <p:txBody>
+          <a:bodyPr/>
+          <a:lstStyle/>
+          <a:p>
+            <a:pPr marL="0" indent="0">
+              <a:buNone/>
+            </a:pPr>
             <a:r>
               <a:rPr lang="en-US" sz="2400" dirty="0"/>
-              <a:t>The top 5 most common aircraft types dominate the dataset, suggesting that incident reporting is concentrated among widely used models. </a:t>
-            </a:r>
-          </a:p>
-          <a:p>
-            <a:pPr algn="just"/>
+              <a:t>From the analysis it is observed that;</a:t>
+            </a:r>
+          </a:p>
+          <a:p>
+            <a:pPr marL="0" indent="0">
+              <a:buNone/>
+            </a:pPr>
+            <a:endParaRPr lang="en-US" sz="2400" dirty="0"/>
+          </a:p>
+          <a:p>
             <a:r>
               <a:rPr lang="en-US" sz="2400" dirty="0"/>
-              <a:t>A small number of operators account for disproportionately high fatalities</a:t>
-            </a:r>
-          </a:p>
-          <a:p>
-            <a:pPr algn="just"/>
+              <a:t>Incident reporting is concentrated among a handful of aircraft types.</a:t>
+            </a:r>
+          </a:p>
+          <a:p>
             <a:r>
               <a:rPr lang="en-US" sz="2400" dirty="0"/>
-              <a:t>The majority of incidents fall under Write-Off and Substantial damage categories, while Minor and No Damage are relatively rare. The presence of missing/unknown entries highlights gaps in reporting consistency and data quality</a:t>
-            </a:r>
-            <a:r>
-              <a:rPr lang="en-US" dirty="0"/>
-              <a:t>.</a:t>
+              <a:t>A few operators account for most fatalities.</a:t>
+            </a:r>
+          </a:p>
+          <a:p>
+            <a:r>
+              <a:rPr lang="en-US" sz="2400" dirty="0"/>
+              <a:t>Severe damage categories drive nearly all fatal outcomes.</a:t>
+            </a:r>
+          </a:p>
+          <a:p>
+            <a:r>
+              <a:rPr lang="en-US" sz="2400" dirty="0"/>
+              <a:t>Missing or inconsistent data highlights the need for stronger reporting standards.</a:t>
             </a:r>
           </a:p>
         </p:txBody>
@@ -4193,7 +4212,12 @@
             <p:ph idx="1"/>
           </p:nvPr>
         </p:nvSpPr>
-        <p:spPr/>
+        <p:spPr>
+          <a:xfrm>
+            <a:off x="838200" y="2205317"/>
+            <a:ext cx="10515600" cy="3971645"/>
+          </a:xfrm>
+        </p:spPr>
         <p:txBody>
           <a:bodyPr>
             <a:normAutofit/>
@@ -4202,20 +4226,23 @@
           <a:p>
             <a:r>
               <a:rPr lang="en-US" sz="2400" dirty="0"/>
-              <a:t>There is need for deeper analysis on the top 5 aircraft types to identify whether their high incident counts are purely due to usage volume or linked to specific safety vulnerabilities.</a:t>
+              <a:t>There is need to investigate high‑incident aircraft types to distinguish between usage volume and design vulnerabilities.</a:t>
             </a:r>
           </a:p>
           <a:p>
             <a:r>
               <a:rPr lang="en-US" sz="2400" dirty="0"/>
-              <a:t> Strengthen reporting standards to minimize “Unknown” or “Missing” classifications.</a:t>
+              <a:t>Conduct operator specific audits targeting those with disproportionate fatalities.</a:t>
             </a:r>
           </a:p>
           <a:p>
             <a:r>
               <a:rPr lang="en-US" sz="2400" dirty="0"/>
-              <a:t> Extend the study to temporal trends (accident dates) and geographic distribution (locations) to uncover patterns that could inform preventive measures</a:t>
-            </a:r>
+              <a:t>Strengthen reporting standards to reduce missing or unknown classifications.</a:t>
+            </a:r>
+          </a:p>
+          <a:p>
+            <a:endParaRPr lang="en-US" sz="2400" dirty="0"/>
           </a:p>
         </p:txBody>
       </p:sp>
@@ -4375,14 +4402,8 @@
           <a:lstStyle/>
           <a:p>
             <a:r>
-              <a:rPr lang="en-US" sz="2000" b="1" dirty="0"/>
-              <a:t>Profile</a:t>
-            </a:r>
-          </a:p>
-          <a:p>
-            <a:r>
               <a:rPr lang="en-US" sz="2000" dirty="0"/>
-              <a:t>Eliud Kibet</a:t>
+              <a:t>Connect with me on:</a:t>
             </a:r>
           </a:p>
           <a:p>
@@ -4607,8 +4628,8 @@
         </p:nvSpPr>
         <p:spPr bwMode="auto">
           <a:xfrm>
-            <a:off x="838200" y="2104446"/>
-            <a:ext cx="10329153" cy="3816429"/>
+            <a:off x="838200" y="2458389"/>
+            <a:ext cx="10329153" cy="3108543"/>
           </a:xfrm>
           <a:prstGeom prst="rect">
             <a:avLst/>
@@ -4656,7 +4677,7 @@
           </a:bodyPr>
           <a:lstStyle/>
           <a:p>
-            <a:pPr marL="0" marR="0" lvl="0" indent="0" algn="l" defTabSz="914400" rtl="0" eaLnBrk="0" fontAlgn="base" latinLnBrk="0" hangingPunct="0">
+            <a:pPr marL="0" lvl="0" indent="0" eaLnBrk="0" fontAlgn="base" hangingPunct="0">
               <a:lnSpc>
                 <a:spcPct val="100000"/>
               </a:lnSpc>
@@ -4666,19 +4687,15 @@
               <a:spcAft>
                 <a:spcPct val="0"/>
               </a:spcAft>
-              <a:buClrTx/>
-              <a:buSzTx/>
-              <a:buFontTx/>
-              <a:buChar char="•"/>
-              <a:tabLst/>
+              <a:buNone/>
             </a:pPr>
             <a:r>
-              <a:rPr lang="en-US" altLang="en-US" dirty="0"/>
-              <a:t>Aviation incidents affect operators, passengers and regulatory compliance. </a:t>
-            </a:r>
-          </a:p>
-          <a:p>
-            <a:pPr marL="0" marR="0" lvl="0" indent="0" algn="l" defTabSz="914400" rtl="0" eaLnBrk="0" fontAlgn="base" latinLnBrk="0" hangingPunct="0">
+              <a:rPr lang="en-US" dirty="0"/>
+              <a:t>Aviation incidents carry high human and financial costs. A such, regulators and operators require clear, data‑driven insights to target safety improvements where they matter most. </a:t>
+            </a:r>
+          </a:p>
+          <a:p>
+            <a:pPr marL="0" lvl="0" indent="0" eaLnBrk="0" fontAlgn="base" hangingPunct="0">
               <a:lnSpc>
                 <a:spcPct val="100000"/>
               </a:lnSpc>
@@ -4688,94 +4705,12 @@
               <a:spcAft>
                 <a:spcPct val="0"/>
               </a:spcAft>
-              <a:buClrTx/>
-              <a:buSzTx/>
-              <a:buFontTx/>
-              <a:buChar char="•"/>
-              <a:tabLst/>
+              <a:buNone/>
             </a:pPr>
-            <a:endParaRPr lang="en-US" altLang="en-US" dirty="0"/>
-          </a:p>
-          <a:p>
-            <a:pPr marL="0" marR="0" lvl="0" indent="0" algn="l" defTabSz="914400" rtl="0" eaLnBrk="0" fontAlgn="base" latinLnBrk="0" hangingPunct="0">
-              <a:lnSpc>
-                <a:spcPct val="100000"/>
-              </a:lnSpc>
-              <a:spcBef>
-                <a:spcPct val="0"/>
-              </a:spcBef>
-              <a:spcAft>
-                <a:spcPct val="0"/>
-              </a:spcAft>
-              <a:buClrTx/>
-              <a:buSzTx/>
-              <a:buFontTx/>
-              <a:buChar char="•"/>
-              <a:tabLst/>
-            </a:pPr>
-            <a:r>
-              <a:rPr lang="en-US" altLang="en-US" dirty="0"/>
-              <a:t>Decision makers need clear evidence to prioritize safety interventions. </a:t>
-            </a:r>
-          </a:p>
-          <a:p>
-            <a:pPr marL="0" marR="0" lvl="0" indent="0" algn="l" defTabSz="914400" rtl="0" eaLnBrk="0" fontAlgn="base" latinLnBrk="0" hangingPunct="0">
-              <a:lnSpc>
-                <a:spcPct val="100000"/>
-              </a:lnSpc>
-              <a:spcBef>
-                <a:spcPct val="0"/>
-              </a:spcBef>
-              <a:spcAft>
-                <a:spcPct val="0"/>
-              </a:spcAft>
-              <a:buClrTx/>
-              <a:buSzTx/>
-              <a:buFontTx/>
-              <a:buChar char="•"/>
-              <a:tabLst/>
-            </a:pPr>
-            <a:endParaRPr lang="en-US" altLang="en-US" dirty="0"/>
-          </a:p>
-          <a:p>
-            <a:pPr marL="0" marR="0" lvl="0" indent="0" algn="l" defTabSz="914400" rtl="0" eaLnBrk="0" fontAlgn="base" latinLnBrk="0" hangingPunct="0">
-              <a:lnSpc>
-                <a:spcPct val="100000"/>
-              </a:lnSpc>
-              <a:spcBef>
-                <a:spcPct val="0"/>
-              </a:spcBef>
-              <a:spcAft>
-                <a:spcPct val="0"/>
-              </a:spcAft>
-              <a:buClrTx/>
-              <a:buSzTx/>
-              <a:buFontTx/>
-              <a:buChar char="•"/>
-              <a:tabLst/>
-            </a:pPr>
-            <a:r>
-              <a:rPr lang="en-US" altLang="en-US" dirty="0"/>
-              <a:t>Our analysis focuses on aircraft types, operator fatalities, and damage severity. </a:t>
-            </a:r>
-          </a:p>
-          <a:p>
-            <a:pPr marL="0" marR="0" lvl="0" indent="0" algn="l" defTabSz="914400" rtl="0" eaLnBrk="0" fontAlgn="base" latinLnBrk="0" hangingPunct="0">
-              <a:lnSpc>
-                <a:spcPct val="100000"/>
-              </a:lnSpc>
-              <a:spcBef>
-                <a:spcPct val="0"/>
-              </a:spcBef>
-              <a:spcAft>
-                <a:spcPct val="0"/>
-              </a:spcAft>
-              <a:buClrTx/>
-              <a:buSzTx/>
-              <a:buFontTx/>
-              <a:buNone/>
-              <a:tabLst/>
-            </a:pPr>
+            <a:r>
+              <a:rPr lang="en-US" dirty="0"/>
+              <a:t>This analysis thus highlights patterns in aircraft types, operator fatalities and damage severity to guide effective interventions.</a:t>
+            </a:r>
             <a:endParaRPr kumimoji="0" lang="en-US" altLang="en-US" sz="1800" b="0" i="0" u="none" strike="noStrike" cap="none" normalizeH="0" baseline="0" dirty="0">
               <a:ln>
                 <a:noFill/>
@@ -4869,8 +4804,8 @@
         </p:nvSpPr>
         <p:spPr bwMode="auto">
           <a:xfrm>
-            <a:off x="838200" y="2206041"/>
-            <a:ext cx="10368064" cy="4119076"/>
+            <a:off x="838200" y="2760038"/>
+            <a:ext cx="10368064" cy="3011081"/>
           </a:xfrm>
           <a:prstGeom prst="rect">
             <a:avLst/>
@@ -4932,7 +4867,7 @@
             </a:pPr>
             <a:r>
               <a:rPr lang="en-US" sz="2000" dirty="0"/>
-              <a:t>The dataset comprised </a:t>
+              <a:t>Our dataset comprised </a:t>
             </a:r>
             <a:r>
               <a:rPr lang="en-US" sz="2000" b="1" dirty="0"/>
@@ -4992,65 +4927,26 @@
           <a:p>
             <a:r>
               <a:rPr lang="en-US" sz="2000" dirty="0"/>
-              <a:t>Short codes in the damage column were mapped into descriptive categories (</a:t>
-            </a:r>
-            <a:r>
-              <a:rPr lang="en-US" sz="2000" i="1" dirty="0"/>
-              <a:t>Write-Off, Substantial, Minor, No Damage</a:t>
-            </a:r>
+              <a:t>Damage codes were standardized into clear categories (Write‑Off, Substantial, Minor, No Damage).</a:t>
+            </a:r>
+          </a:p>
+          <a:p>
             <a:r>
               <a:rPr lang="en-US" sz="2000" dirty="0"/>
-              <a:t>), while unknown or missing entries were treated as </a:t>
-            </a:r>
-            <a:r>
-              <a:rPr lang="en-US" sz="2000" dirty="0" err="1"/>
-              <a:t>NaN</a:t>
-            </a:r>
+              <a:t>Duplicate records and redundant columns were removed.</a:t>
+            </a:r>
+          </a:p>
+          <a:p>
             <a:r>
               <a:rPr lang="en-US" sz="2000" dirty="0"/>
-              <a:t>.</a:t>
+              <a:t>Key fields were renamed for clarity.</a:t>
             </a:r>
           </a:p>
           <a:p>
             <a:r>
               <a:rPr lang="en-US" sz="2000" dirty="0"/>
-              <a:t>One redundant column was deleted, duplicate records were removed and a new index was set for clarity.</a:t>
-            </a:r>
-          </a:p>
-          <a:p>
-            <a:r>
-              <a:rPr lang="en-US" sz="2000" dirty="0"/>
-              <a:t>Four columns were renamed to improve readability</a:t>
-            </a:r>
-          </a:p>
-          <a:p>
-            <a:r>
-              <a:rPr lang="en-US" sz="2000" b="1" dirty="0"/>
-              <a:t>Datatype corrections:</a:t>
-            </a:r>
-            <a:r>
-              <a:rPr lang="en-US" sz="2000" dirty="0"/>
-              <a:t> the </a:t>
-            </a:r>
-            <a:r>
-              <a:rPr lang="en-US" sz="2000" dirty="0" err="1"/>
-              <a:t>accident_date</a:t>
-            </a:r>
-            <a:r>
-              <a:rPr lang="en-US" sz="2000" dirty="0"/>
-              <a:t> (previously </a:t>
-            </a:r>
-            <a:r>
-              <a:rPr lang="en-US" sz="2000" dirty="0" err="1"/>
-              <a:t>crush_date</a:t>
-            </a:r>
-            <a:r>
-              <a:rPr lang="en-US" sz="2000" dirty="0"/>
-              <a:t>) and fatalities columns were converted to appropriate datatypes (datetime and float respectively) to support accurate computation and visualization</a:t>
-            </a:r>
-            <a:endParaRPr lang="en-US" altLang="en-US" sz="2000" dirty="0">
-              <a:latin typeface="Arial Unicode MS"/>
-            </a:endParaRPr>
+              <a:t>Dates and fatalities were converted to correct formats.</a:t>
+            </a:r>
           </a:p>
         </p:txBody>
       </p:sp>
@@ -5134,8 +5030,8 @@
         </p:nvSpPr>
         <p:spPr bwMode="auto">
           <a:xfrm>
-            <a:off x="1096793" y="2037329"/>
-            <a:ext cx="9998413" cy="3649204"/>
+            <a:off x="838200" y="1897537"/>
+            <a:ext cx="9998413" cy="424732"/>
           </a:xfrm>
           <a:prstGeom prst="rect">
             <a:avLst/>
@@ -5188,79 +5084,48 @@
             </a:pPr>
             <a:r>
               <a:rPr lang="en-US" sz="2400" dirty="0"/>
-              <a:t>1. Exploratory data analysis was run</a:t>
-            </a:r>
-          </a:p>
-          <a:p>
-            <a:pPr marL="0" indent="0">
-              <a:buNone/>
-            </a:pPr>
-            <a:r>
-              <a:rPr lang="en-US" sz="2400" dirty="0"/>
-              <a:t>2. Filter Data </a:t>
-            </a:r>
-          </a:p>
-          <a:p>
-            <a:pPr marL="0" indent="0">
-              <a:buNone/>
-            </a:pPr>
-            <a:r>
-              <a:rPr lang="en-US" sz="2400" dirty="0"/>
-              <a:t>    - Deleted one column- "Unnamed: 0"</a:t>
-            </a:r>
-          </a:p>
-          <a:p>
-            <a:pPr marL="0" indent="0">
-              <a:buNone/>
-            </a:pPr>
-            <a:r>
-              <a:rPr lang="en-US" sz="2400" dirty="0"/>
-              <a:t>    - Deleted duplicate data- 1250 rows were found to be duplicates</a:t>
-            </a:r>
-          </a:p>
-          <a:p>
-            <a:pPr marL="0" indent="0">
-              <a:buNone/>
-            </a:pPr>
-            <a:r>
-              <a:rPr lang="en-US" sz="2400" dirty="0"/>
-              <a:t>    - New index set</a:t>
-            </a:r>
-          </a:p>
-          <a:p>
-            <a:pPr marL="0" indent="0">
-              <a:buNone/>
-            </a:pPr>
-            <a:r>
-              <a:rPr lang="en-US" sz="2400" dirty="0"/>
-              <a:t>    - Renamed 4 columns</a:t>
-            </a:r>
-          </a:p>
-          <a:p>
-            <a:pPr marL="0" indent="0">
-              <a:buNone/>
-            </a:pPr>
-            <a:r>
-              <a:rPr lang="en-US" sz="2400" dirty="0"/>
-              <a:t>    - Changed "</a:t>
-            </a:r>
-            <a:r>
-              <a:rPr lang="en-US" sz="2400" dirty="0" err="1"/>
-              <a:t>acc_date</a:t>
-            </a:r>
-            <a:r>
-              <a:rPr lang="en-US" sz="2400" dirty="0"/>
-              <a:t>" and "fat" column datatypes</a:t>
-            </a:r>
-          </a:p>
-          <a:p>
-            <a:r>
-              <a:rPr lang="en-US" sz="2400" dirty="0"/>
-              <a:t>3- Visualization</a:t>
-            </a:r>
-          </a:p>
-        </p:txBody>
-      </p:sp>
+              <a:t>The process followed three steps</a:t>
+            </a:r>
+          </a:p>
+        </p:txBody>
+      </p:sp>
+      <p:pic>
+        <p:nvPicPr>
+          <p:cNvPr id="5" name="Picture 4">
+            <a:extLst>
+              <a:ext uri="{FF2B5EF4-FFF2-40B4-BE49-F238E27FC236}">
+                <a16:creationId xmlns:a16="http://schemas.microsoft.com/office/drawing/2014/main" id="{7D83722E-F5EF-EB42-1371-91E2D7149CFA}"/>
+              </a:ext>
+            </a:extLst>
+          </p:cNvPr>
+          <p:cNvPicPr>
+            <a:picLocks noChangeAspect="1"/>
+          </p:cNvPicPr>
+          <p:nvPr/>
+        </p:nvPicPr>
+        <p:blipFill>
+          <a:blip r:embed="rId2">
+            <a:extLst>
+              <a:ext uri="{28A0092B-C50C-407E-A947-70E740481C1C}">
+                <a14:useLocalDpi xmlns:a14="http://schemas.microsoft.com/office/drawing/2010/main" val="0"/>
+              </a:ext>
+            </a:extLst>
+          </a:blip>
+          <a:srcRect l="30207" t="12390" r="23761" b="10169"/>
+          <a:stretch>
+            <a:fillRect/>
+          </a:stretch>
+        </p:blipFill>
+        <p:spPr>
+          <a:xfrm>
+            <a:off x="6583680" y="1027906"/>
+            <a:ext cx="4887883" cy="5796412"/>
+          </a:xfrm>
+          <a:prstGeom prst="rect">
+            <a:avLst/>
+          </a:prstGeom>
+        </p:spPr>
+      </p:pic>
     </p:spTree>
     <p:extLst>
       <p:ext uri="{BB962C8B-B14F-4D97-AF65-F5344CB8AC3E}">
@@ -5279,6 +5144,154 @@
   <p:cSld>
     <p:spTree>
       <p:nvGrpSpPr>
+        <p:cNvPr id="1" name="">
+          <a:extLst>
+            <a:ext uri="{FF2B5EF4-FFF2-40B4-BE49-F238E27FC236}">
+              <a16:creationId xmlns:a16="http://schemas.microsoft.com/office/drawing/2014/main" id="{52DE77BE-26FF-05BA-2989-CFAEE3100674}"/>
+            </a:ext>
+          </a:extLst>
+        </p:cNvPr>
+        <p:cNvGrpSpPr/>
+        <p:nvPr/>
+      </p:nvGrpSpPr>
+      <p:grpSpPr>
+        <a:xfrm>
+          <a:off x="0" y="0"/>
+          <a:ext cx="0" cy="0"/>
+          <a:chOff x="0" y="0"/>
+          <a:chExt cx="0" cy="0"/>
+        </a:xfrm>
+      </p:grpSpPr>
+      <p:sp>
+        <p:nvSpPr>
+          <p:cNvPr id="2" name="Title 1">
+            <a:extLst>
+              <a:ext uri="{FF2B5EF4-FFF2-40B4-BE49-F238E27FC236}">
+                <a16:creationId xmlns:a16="http://schemas.microsoft.com/office/drawing/2014/main" id="{DB7E95A1-A100-0ECE-C3AC-2E435B2CD590}"/>
+              </a:ext>
+            </a:extLst>
+          </p:cNvPr>
+          <p:cNvSpPr>
+            <a:spLocks noGrp="1"/>
+          </p:cNvSpPr>
+          <p:nvPr>
+            <p:ph type="title"/>
+          </p:nvPr>
+        </p:nvSpPr>
+        <p:spPr>
+          <a:xfrm>
+            <a:off x="838200" y="365125"/>
+            <a:ext cx="10515600" cy="881469"/>
+          </a:xfrm>
+        </p:spPr>
+        <p:txBody>
+          <a:bodyPr/>
+          <a:lstStyle/>
+          <a:p>
+            <a:r>
+              <a:rPr lang="en-US" b="1" dirty="0">
+                <a:solidFill>
+                  <a:schemeClr val="accent6"/>
+                </a:solidFill>
+              </a:rPr>
+              <a:t>Result</a:t>
+            </a:r>
+          </a:p>
+        </p:txBody>
+      </p:sp>
+      <p:sp>
+        <p:nvSpPr>
+          <p:cNvPr id="3" name="Content Placeholder 2">
+            <a:extLst>
+              <a:ext uri="{FF2B5EF4-FFF2-40B4-BE49-F238E27FC236}">
+                <a16:creationId xmlns:a16="http://schemas.microsoft.com/office/drawing/2014/main" id="{6981FC6B-4468-4522-DF2E-AF0A37268DC1}"/>
+              </a:ext>
+            </a:extLst>
+          </p:cNvPr>
+          <p:cNvSpPr>
+            <a:spLocks noGrp="1"/>
+          </p:cNvSpPr>
+          <p:nvPr>
+            <p:ph idx="1"/>
+          </p:nvPr>
+        </p:nvSpPr>
+        <p:spPr>
+          <a:xfrm>
+            <a:off x="993183" y="1810126"/>
+            <a:ext cx="10515600" cy="4351338"/>
+          </a:xfrm>
+        </p:spPr>
+        <p:txBody>
+          <a:bodyPr/>
+          <a:lstStyle/>
+          <a:p>
+            <a:pPr marL="0" indent="0">
+              <a:buNone/>
+            </a:pPr>
+            <a:r>
+              <a:rPr lang="en-US" dirty="0"/>
+              <a:t> </a:t>
+            </a:r>
+          </a:p>
+          <a:p>
+            <a:endParaRPr lang="en-US" dirty="0"/>
+          </a:p>
+        </p:txBody>
+      </p:sp>
+      <p:pic>
+        <p:nvPicPr>
+          <p:cNvPr id="5" name="Picture 4">
+            <a:extLst>
+              <a:ext uri="{FF2B5EF4-FFF2-40B4-BE49-F238E27FC236}">
+                <a16:creationId xmlns:a16="http://schemas.microsoft.com/office/drawing/2014/main" id="{5849C3C2-36E7-1187-25FF-56604DFBAEFF}"/>
+              </a:ext>
+            </a:extLst>
+          </p:cNvPr>
+          <p:cNvPicPr>
+            <a:picLocks noChangeAspect="1"/>
+          </p:cNvPicPr>
+          <p:nvPr/>
+        </p:nvPicPr>
+        <p:blipFill>
+          <a:blip r:embed="rId2">
+            <a:extLst>
+              <a:ext uri="{28A0092B-C50C-407E-A947-70E740481C1C}">
+                <a14:useLocalDpi xmlns:a14="http://schemas.microsoft.com/office/drawing/2010/main" val="0"/>
+              </a:ext>
+            </a:extLst>
+          </a:blip>
+          <a:stretch>
+            <a:fillRect/>
+          </a:stretch>
+        </p:blipFill>
+        <p:spPr>
+          <a:xfrm>
+            <a:off x="993183" y="1246594"/>
+            <a:ext cx="9281348" cy="5478402"/>
+          </a:xfrm>
+          <a:prstGeom prst="rect">
+            <a:avLst/>
+          </a:prstGeom>
+        </p:spPr>
+      </p:pic>
+    </p:spTree>
+    <p:extLst>
+      <p:ext uri="{BB962C8B-B14F-4D97-AF65-F5344CB8AC3E}">
+        <p14:creationId xmlns:p14="http://schemas.microsoft.com/office/powerpoint/2010/main" val="2498245440"/>
+      </p:ext>
+    </p:extLst>
+  </p:cSld>
+  <p:clrMapOvr>
+    <a:masterClrMapping/>
+  </p:clrMapOvr>
+</p:sld>
+</file>
+
+<file path=ppt/slides/slide7.xml><?xml version="1.0" encoding="utf-8"?>
+<p:sld xmlns:a="http://schemas.openxmlformats.org/drawingml/2006/main" xmlns:r="http://schemas.openxmlformats.org/officeDocument/2006/relationships" xmlns:p="http://schemas.openxmlformats.org/presentationml/2006/main">
+  <p:cSld>
+    <p:spTree>
+      <p:nvGrpSpPr>
         <p:cNvPr id="1" name=""/>
         <p:cNvGrpSpPr/>
         <p:nvPr/>
@@ -5341,25 +5354,23 @@
         </p:nvSpPr>
         <p:spPr>
           <a:xfrm>
-            <a:off x="993183" y="1810126"/>
+            <a:off x="975754" y="1690688"/>
             <a:ext cx="10515600" cy="4351338"/>
           </a:xfrm>
         </p:spPr>
         <p:txBody>
-          <a:bodyPr/>
-          <a:lstStyle/>
-          <a:p>
-            <a:r>
-              <a:rPr lang="en-US" i="1" dirty="0"/>
-              <a:t>Aircraft Types: </a:t>
-            </a:r>
-            <a:r>
-              <a:rPr lang="en-US" dirty="0"/>
-              <a:t>Top 5 models dominate incident records. </a:t>
-            </a:r>
-          </a:p>
-          <a:p>
-            <a:endParaRPr lang="en-US" dirty="0"/>
+          <a:bodyPr>
+            <a:normAutofit/>
+          </a:bodyPr>
+          <a:lstStyle/>
+          <a:p>
+            <a:pPr marL="0" indent="0">
+              <a:buNone/>
+            </a:pPr>
+            <a:r>
+              <a:rPr lang="en-US" sz="2000" dirty="0"/>
+              <a:t>Only five aircraft types account for the majority of incidents, suggesting that widely used models concentrate risk exposure.</a:t>
+            </a:r>
           </a:p>
         </p:txBody>
       </p:sp>
@@ -5417,154 +5428,6 @@
 </p:sld>
 </file>
 
-<file path=ppt/slides/slide7.xml><?xml version="1.0" encoding="utf-8"?>
-<p:sld xmlns:a="http://schemas.openxmlformats.org/drawingml/2006/main" xmlns:r="http://schemas.openxmlformats.org/officeDocument/2006/relationships" xmlns:p="http://schemas.openxmlformats.org/presentationml/2006/main">
-  <p:cSld>
-    <p:spTree>
-      <p:nvGrpSpPr>
-        <p:cNvPr id="1" name="">
-          <a:extLst>
-            <a:ext uri="{FF2B5EF4-FFF2-40B4-BE49-F238E27FC236}">
-              <a16:creationId xmlns:a16="http://schemas.microsoft.com/office/drawing/2014/main" id="{52DE77BE-26FF-05BA-2989-CFAEE3100674}"/>
-            </a:ext>
-          </a:extLst>
-        </p:cNvPr>
-        <p:cNvGrpSpPr/>
-        <p:nvPr/>
-      </p:nvGrpSpPr>
-      <p:grpSpPr>
-        <a:xfrm>
-          <a:off x="0" y="0"/>
-          <a:ext cx="0" cy="0"/>
-          <a:chOff x="0" y="0"/>
-          <a:chExt cx="0" cy="0"/>
-        </a:xfrm>
-      </p:grpSpPr>
-      <p:sp>
-        <p:nvSpPr>
-          <p:cNvPr id="2" name="Title 1">
-            <a:extLst>
-              <a:ext uri="{FF2B5EF4-FFF2-40B4-BE49-F238E27FC236}">
-                <a16:creationId xmlns:a16="http://schemas.microsoft.com/office/drawing/2014/main" id="{DB7E95A1-A100-0ECE-C3AC-2E435B2CD590}"/>
-              </a:ext>
-            </a:extLst>
-          </p:cNvPr>
-          <p:cNvSpPr>
-            <a:spLocks noGrp="1"/>
-          </p:cNvSpPr>
-          <p:nvPr>
-            <p:ph type="title"/>
-          </p:nvPr>
-        </p:nvSpPr>
-        <p:spPr>
-          <a:xfrm>
-            <a:off x="838200" y="365125"/>
-            <a:ext cx="10515600" cy="881469"/>
-          </a:xfrm>
-        </p:spPr>
-        <p:txBody>
-          <a:bodyPr/>
-          <a:lstStyle/>
-          <a:p>
-            <a:r>
-              <a:rPr lang="en-US" b="1" dirty="0">
-                <a:solidFill>
-                  <a:schemeClr val="accent6"/>
-                </a:solidFill>
-              </a:rPr>
-              <a:t>Result</a:t>
-            </a:r>
-          </a:p>
-        </p:txBody>
-      </p:sp>
-      <p:sp>
-        <p:nvSpPr>
-          <p:cNvPr id="3" name="Content Placeholder 2">
-            <a:extLst>
-              <a:ext uri="{FF2B5EF4-FFF2-40B4-BE49-F238E27FC236}">
-                <a16:creationId xmlns:a16="http://schemas.microsoft.com/office/drawing/2014/main" id="{6981FC6B-4468-4522-DF2E-AF0A37268DC1}"/>
-              </a:ext>
-            </a:extLst>
-          </p:cNvPr>
-          <p:cNvSpPr>
-            <a:spLocks noGrp="1"/>
-          </p:cNvSpPr>
-          <p:nvPr>
-            <p:ph idx="1"/>
-          </p:nvPr>
-        </p:nvSpPr>
-        <p:spPr>
-          <a:xfrm>
-            <a:off x="993183" y="1810126"/>
-            <a:ext cx="10515600" cy="4351338"/>
-          </a:xfrm>
-        </p:spPr>
-        <p:txBody>
-          <a:bodyPr/>
-          <a:lstStyle/>
-          <a:p>
-            <a:pPr marL="0" indent="0">
-              <a:buNone/>
-            </a:pPr>
-            <a:r>
-              <a:rPr lang="en-US" dirty="0"/>
-              <a:t> </a:t>
-            </a:r>
-          </a:p>
-          <a:p>
-            <a:endParaRPr lang="en-US" dirty="0"/>
-          </a:p>
-        </p:txBody>
-      </p:sp>
-      <p:pic>
-        <p:nvPicPr>
-          <p:cNvPr id="5" name="Picture 4">
-            <a:extLst>
-              <a:ext uri="{FF2B5EF4-FFF2-40B4-BE49-F238E27FC236}">
-                <a16:creationId xmlns:a16="http://schemas.microsoft.com/office/drawing/2014/main" id="{5849C3C2-36E7-1187-25FF-56604DFBAEFF}"/>
-              </a:ext>
-            </a:extLst>
-          </p:cNvPr>
-          <p:cNvPicPr>
-            <a:picLocks noChangeAspect="1"/>
-          </p:cNvPicPr>
-          <p:nvPr/>
-        </p:nvPicPr>
-        <p:blipFill>
-          <a:blip r:embed="rId2">
-            <a:extLst>
-              <a:ext uri="{28A0092B-C50C-407E-A947-70E740481C1C}">
-                <a14:useLocalDpi xmlns:a14="http://schemas.microsoft.com/office/drawing/2010/main" val="0"/>
-              </a:ext>
-            </a:extLst>
-          </a:blip>
-          <a:stretch>
-            <a:fillRect/>
-          </a:stretch>
-        </p:blipFill>
-        <p:spPr>
-          <a:xfrm>
-            <a:off x="993183" y="1246594"/>
-            <a:ext cx="9281348" cy="5478402"/>
-          </a:xfrm>
-          <a:prstGeom prst="rect">
-            <a:avLst/>
-          </a:prstGeom>
-        </p:spPr>
-      </p:pic>
-    </p:spTree>
-    <p:extLst>
-      <p:ext uri="{BB962C8B-B14F-4D97-AF65-F5344CB8AC3E}">
-        <p14:creationId xmlns:p14="http://schemas.microsoft.com/office/powerpoint/2010/main" val="2498245440"/>
-      </p:ext>
-    </p:extLst>
-  </p:cSld>
-  <p:clrMapOvr>
-    <a:masterClrMapping/>
-  </p:clrMapOvr>
-</p:sld>
-</file>
-
 <file path=ppt/slides/slide8.xml><?xml version="1.0" encoding="utf-8"?>
 <p:sld xmlns:a="http://schemas.openxmlformats.org/drawingml/2006/main" xmlns:r="http://schemas.openxmlformats.org/officeDocument/2006/relationships" xmlns:p="http://schemas.openxmlformats.org/presentationml/2006/main">
   <p:cSld>
@@ -5638,20 +5501,22 @@
         </p:nvSpPr>
         <p:spPr>
           <a:xfrm>
-            <a:off x="993183" y="1810126"/>
+            <a:off x="838200" y="1552576"/>
             <a:ext cx="10515600" cy="4351338"/>
           </a:xfrm>
         </p:spPr>
         <p:txBody>
-          <a:bodyPr/>
+          <a:bodyPr>
+            <a:normAutofit/>
+          </a:bodyPr>
           <a:lstStyle/>
           <a:p>
             <a:pPr marL="0" indent="0">
               <a:buNone/>
             </a:pPr>
             <a:r>
-              <a:rPr lang="en-US" dirty="0"/>
-              <a:t>A few operators account for most aircraft fatalities</a:t>
+              <a:rPr lang="en-US" sz="2000" dirty="0"/>
+              <a:t>Fatalities are disproportionately concentrated among a small number of operators. This indicates that targeted safety audits and operator‑specific interventions could significantly reduce overall risk</a:t>
             </a:r>
           </a:p>
         </p:txBody>
@@ -5684,7 +5549,7 @@
         </p:blipFill>
         <p:spPr>
           <a:xfrm>
-            <a:off x="1614405" y="2661819"/>
+            <a:off x="2582592" y="2510390"/>
             <a:ext cx="7793065" cy="3982485"/>
           </a:xfrm>
           <a:prstGeom prst="rect">
@@ -5788,15 +5653,17 @@
           </a:xfrm>
         </p:spPr>
         <p:txBody>
-          <a:bodyPr/>
+          <a:bodyPr>
+            <a:normAutofit/>
+          </a:bodyPr>
           <a:lstStyle/>
           <a:p>
             <a:pPr marL="0" indent="0">
               <a:buNone/>
             </a:pPr>
             <a:r>
-              <a:rPr lang="en-US" dirty="0"/>
-              <a:t>Severe damage (Write-Off, Substantial) is most common </a:t>
+              <a:rPr lang="en-US" sz="2400" dirty="0"/>
+              <a:t>Severe damage categories (Write‑Off and Substantial) dominate the dataset. Critically, 97% of fatalities occur in write‑off incidents</a:t>
             </a:r>
           </a:p>
         </p:txBody>

</xml_diff>